<commit_message>
Updated materials from class
</commit_message>
<xml_diff>
--- a/Classes/Class_3/5_CPP_Basics_Classes_2.pptx
+++ b/Classes/Class_3/5_CPP_Basics_Classes_2.pptx
@@ -222,7 +222,7 @@
           <a:p>
             <a:fld id="{DB430043-EE85-4B6C-A802-3E6B16F216A2}" type="datetimeFigureOut">
               <a:rPr lang="en-IL" smtClean="0"/>
-              <a:t>13/11/2022</a:t>
+              <a:t>14/11/2022</a:t>
             </a:fld>
             <a:endParaRPr lang="en-IL"/>
           </a:p>
@@ -487,7 +487,7 @@
           <a:p>
             <a:fld id="{6B548E75-1D94-41E4-8CAC-9631837BFE23}" type="datetimeFigureOut">
               <a:rPr lang="en-IL" smtClean="0"/>
-              <a:t>13/11/2022</a:t>
+              <a:t>14/11/2022</a:t>
             </a:fld>
             <a:endParaRPr lang="en-IL"/>
           </a:p>
@@ -754,7 +754,7 @@
           <a:p>
             <a:fld id="{6B548E75-1D94-41E4-8CAC-9631837BFE23}" type="datetimeFigureOut">
               <a:rPr lang="en-IL" smtClean="0"/>
-              <a:t>13/11/2022</a:t>
+              <a:t>14/11/2022</a:t>
             </a:fld>
             <a:endParaRPr lang="en-IL"/>
           </a:p>
@@ -985,7 +985,7 @@
           <a:p>
             <a:fld id="{6B548E75-1D94-41E4-8CAC-9631837BFE23}" type="datetimeFigureOut">
               <a:rPr lang="en-IL" smtClean="0"/>
-              <a:t>13/11/2022</a:t>
+              <a:t>14/11/2022</a:t>
             </a:fld>
             <a:endParaRPr lang="en-IL"/>
           </a:p>
@@ -1295,7 +1295,7 @@
           <a:p>
             <a:fld id="{6B548E75-1D94-41E4-8CAC-9631837BFE23}" type="datetimeFigureOut">
               <a:rPr lang="en-IL" smtClean="0"/>
-              <a:t>13/11/2022</a:t>
+              <a:t>14/11/2022</a:t>
             </a:fld>
             <a:endParaRPr lang="en-IL"/>
           </a:p>
@@ -1768,7 +1768,7 @@
           <a:p>
             <a:fld id="{6B548E75-1D94-41E4-8CAC-9631837BFE23}" type="datetimeFigureOut">
               <a:rPr lang="en-IL" smtClean="0"/>
-              <a:t>13/11/2022</a:t>
+              <a:t>14/11/2022</a:t>
             </a:fld>
             <a:endParaRPr lang="en-IL"/>
           </a:p>
@@ -2315,7 +2315,7 @@
           <a:p>
             <a:fld id="{6B548E75-1D94-41E4-8CAC-9631837BFE23}" type="datetimeFigureOut">
               <a:rPr lang="en-IL" smtClean="0"/>
-              <a:t>13/11/2022</a:t>
+              <a:t>14/11/2022</a:t>
             </a:fld>
             <a:endParaRPr lang="en-IL"/>
           </a:p>
@@ -3089,7 +3089,7 @@
           <a:p>
             <a:fld id="{6B548E75-1D94-41E4-8CAC-9631837BFE23}" type="datetimeFigureOut">
               <a:rPr lang="en-IL" smtClean="0"/>
-              <a:t>13/11/2022</a:t>
+              <a:t>14/11/2022</a:t>
             </a:fld>
             <a:endParaRPr lang="en-IL"/>
           </a:p>
@@ -3264,7 +3264,7 @@
           <a:p>
             <a:fld id="{6B548E75-1D94-41E4-8CAC-9631837BFE23}" type="datetimeFigureOut">
               <a:rPr lang="en-IL" smtClean="0"/>
-              <a:t>13/11/2022</a:t>
+              <a:t>14/11/2022</a:t>
             </a:fld>
             <a:endParaRPr lang="en-IL"/>
           </a:p>
@@ -3487,7 +3487,7 @@
           <a:p>
             <a:fld id="{6B548E75-1D94-41E4-8CAC-9631837BFE23}" type="datetimeFigureOut">
               <a:rPr lang="en-IL" smtClean="0"/>
-              <a:t>13/11/2022</a:t>
+              <a:t>14/11/2022</a:t>
             </a:fld>
             <a:endParaRPr lang="en-IL"/>
           </a:p>
@@ -3667,7 +3667,7 @@
           <a:p>
             <a:fld id="{6B548E75-1D94-41E4-8CAC-9631837BFE23}" type="datetimeFigureOut">
               <a:rPr lang="en-IL" smtClean="0"/>
-              <a:t>13/11/2022</a:t>
+              <a:t>14/11/2022</a:t>
             </a:fld>
             <a:endParaRPr lang="en-IL"/>
           </a:p>
@@ -3956,7 +3956,7 @@
           <a:p>
             <a:fld id="{6B548E75-1D94-41E4-8CAC-9631837BFE23}" type="datetimeFigureOut">
               <a:rPr lang="en-IL" smtClean="0"/>
-              <a:t>13/11/2022</a:t>
+              <a:t>14/11/2022</a:t>
             </a:fld>
             <a:endParaRPr lang="en-IL"/>
           </a:p>
@@ -4198,7 +4198,7 @@
           <a:p>
             <a:fld id="{6B548E75-1D94-41E4-8CAC-9631837BFE23}" type="datetimeFigureOut">
               <a:rPr lang="en-IL" smtClean="0"/>
-              <a:t>13/11/2022</a:t>
+              <a:t>14/11/2022</a:t>
             </a:fld>
             <a:endParaRPr lang="en-IL"/>
           </a:p>
@@ -4577,7 +4577,7 @@
           <a:p>
             <a:fld id="{6B548E75-1D94-41E4-8CAC-9631837BFE23}" type="datetimeFigureOut">
               <a:rPr lang="en-IL" smtClean="0"/>
-              <a:t>13/11/2022</a:t>
+              <a:t>14/11/2022</a:t>
             </a:fld>
             <a:endParaRPr lang="en-IL"/>
           </a:p>
@@ -4695,7 +4695,7 @@
           <a:p>
             <a:fld id="{6B548E75-1D94-41E4-8CAC-9631837BFE23}" type="datetimeFigureOut">
               <a:rPr lang="en-IL" smtClean="0"/>
-              <a:t>13/11/2022</a:t>
+              <a:t>14/11/2022</a:t>
             </a:fld>
             <a:endParaRPr lang="en-IL"/>
           </a:p>
@@ -4790,7 +4790,7 @@
           <a:p>
             <a:fld id="{6B548E75-1D94-41E4-8CAC-9631837BFE23}" type="datetimeFigureOut">
               <a:rPr lang="en-IL" smtClean="0"/>
-              <a:t>13/11/2022</a:t>
+              <a:t>14/11/2022</a:t>
             </a:fld>
             <a:endParaRPr lang="en-IL"/>
           </a:p>
@@ -5039,7 +5039,7 @@
           <a:p>
             <a:fld id="{6B548E75-1D94-41E4-8CAC-9631837BFE23}" type="datetimeFigureOut">
               <a:rPr lang="en-IL" smtClean="0"/>
-              <a:t>13/11/2022</a:t>
+              <a:t>14/11/2022</a:t>
             </a:fld>
             <a:endParaRPr lang="en-IL"/>
           </a:p>
@@ -5296,7 +5296,7 @@
           <a:p>
             <a:fld id="{6B548E75-1D94-41E4-8CAC-9631837BFE23}" type="datetimeFigureOut">
               <a:rPr lang="en-IL" smtClean="0"/>
-              <a:t>13/11/2022</a:t>
+              <a:t>14/11/2022</a:t>
             </a:fld>
             <a:endParaRPr lang="en-IL"/>
           </a:p>
@@ -5558,7 +5558,7 @@
           <a:p>
             <a:fld id="{6B548E75-1D94-41E4-8CAC-9631837BFE23}" type="datetimeFigureOut">
               <a:rPr lang="en-IL" smtClean="0"/>
-              <a:t>13/11/2022</a:t>
+              <a:t>14/11/2022</a:t>
             </a:fld>
             <a:endParaRPr lang="en-IL"/>
           </a:p>
@@ -7309,7 +7309,7 @@
           <a:p>
             <a:r>
               <a:rPr lang="en-GB" sz="2400" dirty="0"/>
-              <a:t>1 header filer per class for </a:t>
+              <a:t>1 header file per class for </a:t>
             </a:r>
             <a:r>
               <a:rPr lang="en-GB" sz="2400" dirty="0" err="1"/>
@@ -8127,7 +8127,7 @@
         </p:spPr>
         <p:txBody>
           <a:bodyPr>
-            <a:normAutofit fontScale="62500" lnSpcReduction="20000"/>
+            <a:normAutofit fontScale="55000" lnSpcReduction="20000"/>
           </a:bodyPr>
           <a:lstStyle/>
           <a:p>
@@ -8154,7 +8154,7 @@
                 <a:latin typeface="Cascadia Code" panose="020B0609020000020004" pitchFamily="49" charset="0"/>
                 <a:cs typeface="Cascadia Code" panose="020B0609020000020004" pitchFamily="49" charset="0"/>
               </a:rPr>
-              <a:t>#include </a:t>
+              <a:t>#include “</a:t>
             </a:r>
             <a:r>
               <a:rPr lang="en-GB" sz="1600" dirty="0" err="1">
@@ -8163,10 +8163,13 @@
               </a:rPr>
               <a:t>Player.h</a:t>
             </a:r>
-            <a:endParaRPr lang="en-GB" sz="1600" dirty="0">
-              <a:latin typeface="Cascadia Code" panose="020B0609020000020004" pitchFamily="49" charset="0"/>
-              <a:cs typeface="Cascadia Code" panose="020B0609020000020004" pitchFamily="49" charset="0"/>
-            </a:endParaRPr>
+            <a:r>
+              <a:rPr lang="en-GB" sz="1600" dirty="0">
+                <a:latin typeface="Cascadia Code" panose="020B0609020000020004" pitchFamily="49" charset="0"/>
+                <a:cs typeface="Cascadia Code" panose="020B0609020000020004" pitchFamily="49" charset="0"/>
+              </a:rPr>
+              <a:t>”</a:t>
+            </a:r>
           </a:p>
           <a:p>
             <a:pPr marL="0" indent="0">
@@ -8198,7 +8201,19 @@
                 <a:latin typeface="Cascadia Code" panose="020B0609020000020004" pitchFamily="49" charset="0"/>
                 <a:cs typeface="Cascadia Code" panose="020B0609020000020004" pitchFamily="49" charset="0"/>
               </a:rPr>
-              <a:t>{}</a:t>
+              <a:t>{</a:t>
+            </a:r>
+          </a:p>
+          <a:p>
+            <a:pPr marL="0" indent="0">
+              <a:buNone/>
+            </a:pPr>
+            <a:r>
+              <a:rPr lang="en-GB" sz="1600" dirty="0">
+                <a:latin typeface="Cascadia Code" panose="020B0609020000020004" pitchFamily="49" charset="0"/>
+                <a:cs typeface="Cascadia Code" panose="020B0609020000020004" pitchFamily="49" charset="0"/>
+              </a:rPr>
+              <a:t>}</a:t>
             </a:r>
           </a:p>
           <a:p>
@@ -8252,7 +8267,7 @@
                 <a:latin typeface="Cascadia Code" panose="020B0609020000020004" pitchFamily="49" charset="0"/>
                 <a:cs typeface="Cascadia Code" panose="020B0609020000020004" pitchFamily="49" charset="0"/>
               </a:rPr>
-              <a:t>Void Player::</a:t>
+              <a:t>void Player::</a:t>
             </a:r>
             <a:r>
               <a:rPr lang="en-GB" sz="1600" dirty="0" err="1">
@@ -8612,7 +8627,14 @@
                 <a:latin typeface="Cascadia Code" panose="020B0609020000020004" pitchFamily="49" charset="0"/>
                 <a:cs typeface="Cascadia Code" panose="020B0609020000020004" pitchFamily="49" charset="0"/>
               </a:rPr>
-              <a:t>	Player p1; </a:t>
+              <a:t>	</a:t>
+            </a:r>
+            <a:r>
+              <a:rPr lang="en-GB" sz="1600">
+                <a:latin typeface="Cascadia Code" panose="020B0609020000020004" pitchFamily="49" charset="0"/>
+                <a:cs typeface="Cascadia Code" panose="020B0609020000020004" pitchFamily="49" charset="0"/>
+              </a:rPr>
+              <a:t>Player p1; </a:t>
             </a:r>
             <a:r>
               <a:rPr lang="en-GB" sz="1600" dirty="0">

</xml_diff>